<commit_message>
proof reading reflection is done until certikos
</commit_message>
<xml_diff>
--- a/figs/conlink/overview.pptx
+++ b/figs/conlink/overview.pptx
@@ -210,7 +210,7 @@
             <a:fld id="{380D8660-F07B-498C-938B-4796F5F0F2DB}" type="datetimeFigureOut">
               <a:rPr lang="en-US" smtClean="0"/>
               <a:pPr/>
-              <a:t>3/10/19</a:t>
+              <a:t>3/14/19</a:t>
             </a:fld>
             <a:endParaRPr lang="en-US"/>
           </a:p>
@@ -3975,7 +3975,7 @@
                   <a:schemeClr val="tx1"/>
                 </a:solidFill>
               </a:rPr>
-              <a:t>Non-deterministic multicore machine model</a:t>
+              <a:t>Nondeterministic multicore machine model</a:t>
             </a:r>
             <a:endParaRPr lang="en-US" sz="1400" dirty="0"/>
           </a:p>

</xml_diff>